<commit_message>
Add Week 4 material, and update Week 3 a bit
</commit_message>
<xml_diff>
--- a/Week 3/Week 3.pptx
+++ b/Week 3/Week 3.pptx
@@ -158,7 +158,7 @@
   </p:defaultTextStyle>
   <p:extLst>
     <p:ext uri="{EFAFB233-063F-42B5-8137-9DF3F51BA10A}">
-      <p15:sldGuideLst xmlns="" xmlns:p15="http://schemas.microsoft.com/office/powerpoint/2012/main">
+      <p15:sldGuideLst xmlns:p15="http://schemas.microsoft.com/office/powerpoint/2012/main" xmlns="">
         <p15:guide id="1" orient="horz" pos="2160">
           <p15:clr>
             <a:srgbClr val="A4A3A4"/>
@@ -257,7 +257,7 @@
           <a:p>
             <a:fld id="{90AF4669-11A5-AA4B-ACB6-1CD3E71EA0D2}" type="datetimeFigureOut">
               <a:rPr lang="en-US" smtClean="0"/>
-              <a:t>1/21/15</a:t>
+              <a:t>1/22/15</a:t>
             </a:fld>
             <a:endParaRPr lang="en-US"/>
           </a:p>
@@ -815,7 +815,7 @@
           <a:p>
             <a:fld id="{C95D1B94-35C6-4950-B226-D68A01DA1DCF}" type="datetimeFigureOut">
               <a:rPr lang="en-US" smtClean="0"/>
-              <a:t>1/21/15</a:t>
+              <a:t>1/22/15</a:t>
             </a:fld>
             <a:endParaRPr lang="en-US"/>
           </a:p>
@@ -980,7 +980,7 @@
           <a:p>
             <a:fld id="{C95D1B94-35C6-4950-B226-D68A01DA1DCF}" type="datetimeFigureOut">
               <a:rPr lang="en-US" smtClean="0"/>
-              <a:t>1/21/15</a:t>
+              <a:t>1/22/15</a:t>
             </a:fld>
             <a:endParaRPr lang="en-US"/>
           </a:p>
@@ -1155,7 +1155,7 @@
           <a:p>
             <a:fld id="{C95D1B94-35C6-4950-B226-D68A01DA1DCF}" type="datetimeFigureOut">
               <a:rPr lang="en-US" smtClean="0"/>
-              <a:t>1/21/15</a:t>
+              <a:t>1/22/15</a:t>
             </a:fld>
             <a:endParaRPr lang="en-US"/>
           </a:p>
@@ -1338,7 +1338,7 @@
           <a:p>
             <a:fld id="{C95D1B94-35C6-4950-B226-D68A01DA1DCF}" type="datetimeFigureOut">
               <a:rPr lang="en-US" smtClean="0"/>
-              <a:t>1/21/15</a:t>
+              <a:t>1/22/15</a:t>
             </a:fld>
             <a:endParaRPr lang="en-US"/>
           </a:p>
@@ -1600,7 +1600,7 @@
           <a:p>
             <a:fld id="{C95D1B94-35C6-4950-B226-D68A01DA1DCF}" type="datetimeFigureOut">
               <a:rPr lang="en-US" smtClean="0"/>
-              <a:t>1/21/15</a:t>
+              <a:t>1/22/15</a:t>
             </a:fld>
             <a:endParaRPr lang="en-US"/>
           </a:p>
@@ -1948,7 +1948,7 @@
           <a:p>
             <a:fld id="{C95D1B94-35C6-4950-B226-D68A01DA1DCF}" type="datetimeFigureOut">
               <a:rPr lang="en-US" smtClean="0"/>
-              <a:t>1/21/15</a:t>
+              <a:t>1/22/15</a:t>
             </a:fld>
             <a:endParaRPr lang="en-US"/>
           </a:p>
@@ -2256,7 +2256,7 @@
           <a:p>
             <a:fld id="{C95D1B94-35C6-4950-B226-D68A01DA1DCF}" type="datetimeFigureOut">
               <a:rPr lang="en-US" smtClean="0"/>
-              <a:t>1/21/15</a:t>
+              <a:t>1/22/15</a:t>
             </a:fld>
             <a:endParaRPr lang="en-US"/>
           </a:p>
@@ -2483,7 +2483,7 @@
           <a:p>
             <a:fld id="{C95D1B94-35C6-4950-B226-D68A01DA1DCF}" type="datetimeFigureOut">
               <a:rPr lang="en-US" smtClean="0"/>
-              <a:t>1/21/15</a:t>
+              <a:t>1/22/15</a:t>
             </a:fld>
             <a:endParaRPr lang="en-US"/>
           </a:p>
@@ -2573,7 +2573,7 @@
           <a:p>
             <a:fld id="{C95D1B94-35C6-4950-B226-D68A01DA1DCF}" type="datetimeFigureOut">
               <a:rPr lang="en-US" smtClean="0"/>
-              <a:t>1/21/15</a:t>
+              <a:t>1/22/15</a:t>
             </a:fld>
             <a:endParaRPr lang="en-US"/>
           </a:p>
@@ -2861,7 +2861,7 @@
           <a:p>
             <a:fld id="{C95D1B94-35C6-4950-B226-D68A01DA1DCF}" type="datetimeFigureOut">
               <a:rPr lang="en-US" smtClean="0"/>
-              <a:t>1/21/15</a:t>
+              <a:t>1/22/15</a:t>
             </a:fld>
             <a:endParaRPr lang="en-US"/>
           </a:p>
@@ -3130,7 +3130,7 @@
           <a:p>
             <a:fld id="{C95D1B94-35C6-4950-B226-D68A01DA1DCF}" type="datetimeFigureOut">
               <a:rPr lang="en-US" smtClean="0"/>
-              <a:t>1/21/15</a:t>
+              <a:t>1/22/15</a:t>
             </a:fld>
             <a:endParaRPr lang="en-US"/>
           </a:p>
@@ -3340,7 +3340,7 @@
           <a:p>
             <a:fld id="{C95D1B94-35C6-4950-B226-D68A01DA1DCF}" type="datetimeFigureOut">
               <a:rPr lang="en-US" smtClean="0"/>
-              <a:t>1/21/15</a:t>
+              <a:t>1/22/15</a:t>
             </a:fld>
             <a:endParaRPr lang="en-US"/>
           </a:p>
@@ -4247,7 +4247,7 @@
               <a:buNone/>
             </a:pPr>
             <a:r>
-              <a:rPr lang="en-US" sz="1600" dirty="0">
+              <a:rPr lang="en-US" altLang="ja-JP" sz="1600" dirty="0" smtClean="0">
                 <a:solidFill>
                   <a:srgbClr val="0000FF"/>
                 </a:solidFill>
@@ -4256,12 +4256,12 @@
                 </a:highlight>
                 <a:latin typeface="Consolas" panose="020B0609020204030204" pitchFamily="49" charset="0"/>
               </a:rPr>
-              <a:t>Class</a:t>
-            </a:r>
-            <a:r>
-              <a:rPr lang="en-US" sz="1600" dirty="0">
-                <a:solidFill>
-                  <a:srgbClr val="000000"/>
+              <a:t>public</a:t>
+            </a:r>
+            <a:r>
+              <a:rPr lang="ja-JP" altLang="en-US" sz="1600" dirty="0" smtClean="0">
+                <a:solidFill>
+                  <a:srgbClr val="0000FF"/>
                 </a:solidFill>
                 <a:highlight>
                   <a:srgbClr val="FFFFFF"/>
@@ -4271,7 +4271,67 @@
               <a:t> </a:t>
             </a:r>
             <a:r>
-              <a:rPr lang="en-US" sz="1600" dirty="0" err="1">
+              <a:rPr lang="en-US" altLang="ja-JP" sz="1600" dirty="0" smtClean="0">
+                <a:solidFill>
+                  <a:srgbClr val="0000FF"/>
+                </a:solidFill>
+                <a:highlight>
+                  <a:srgbClr val="FFFFFF"/>
+                </a:highlight>
+                <a:latin typeface="Consolas" panose="020B0609020204030204" pitchFamily="49" charset="0"/>
+              </a:rPr>
+              <a:t>ref</a:t>
+            </a:r>
+            <a:r>
+              <a:rPr lang="ja-JP" altLang="en-US" sz="1600" dirty="0" smtClean="0">
+                <a:solidFill>
+                  <a:srgbClr val="0000FF"/>
+                </a:solidFill>
+                <a:highlight>
+                  <a:srgbClr val="FFFFFF"/>
+                </a:highlight>
+                <a:latin typeface="Consolas" panose="020B0609020204030204" pitchFamily="49" charset="0"/>
+              </a:rPr>
+              <a:t> </a:t>
+            </a:r>
+            <a:r>
+              <a:rPr lang="en-US" altLang="ja-JP" sz="1600" dirty="0" smtClean="0">
+                <a:solidFill>
+                  <a:srgbClr val="0000FF"/>
+                </a:solidFill>
+                <a:highlight>
+                  <a:srgbClr val="FFFFFF"/>
+                </a:highlight>
+                <a:latin typeface="Consolas" panose="020B0609020204030204" pitchFamily="49" charset="0"/>
+              </a:rPr>
+              <a:t>c</a:t>
+            </a:r>
+            <a:r>
+              <a:rPr lang="en-US" sz="1600" dirty="0" smtClean="0">
+                <a:solidFill>
+                  <a:srgbClr val="0000FF"/>
+                </a:solidFill>
+                <a:highlight>
+                  <a:srgbClr val="FFFFFF"/>
+                </a:highlight>
+                <a:latin typeface="Consolas" panose="020B0609020204030204" pitchFamily="49" charset="0"/>
+              </a:rPr>
+              <a:t>lass</a:t>
+            </a:r>
+            <a:r>
+              <a:rPr lang="en-US" sz="1600" dirty="0" smtClean="0">
+                <a:solidFill>
+                  <a:srgbClr val="000000"/>
+                </a:solidFill>
+                <a:highlight>
+                  <a:srgbClr val="FFFFFF"/>
+                </a:highlight>
+                <a:latin typeface="Consolas" panose="020B0609020204030204" pitchFamily="49" charset="0"/>
+              </a:rPr>
+              <a:t> </a:t>
+            </a:r>
+            <a:r>
+              <a:rPr lang="en-US" sz="1600" dirty="0" err="1" smtClean="0">
                 <a:solidFill>
                   <a:srgbClr val="2B91AF"/>
                 </a:solidFill>
@@ -4281,6 +4341,30 @@
                 <a:latin typeface="Consolas" panose="020B0609020204030204" pitchFamily="49" charset="0"/>
               </a:rPr>
               <a:t>SignalGenerator</a:t>
+            </a:r>
+            <a:r>
+              <a:rPr lang="ja-JP" altLang="en-US" sz="1600" smtClean="0">
+                <a:solidFill>
+                  <a:srgbClr val="2B91AF"/>
+                </a:solidFill>
+                <a:highlight>
+                  <a:srgbClr val="FFFFFF"/>
+                </a:highlight>
+                <a:latin typeface="Consolas" panose="020B0609020204030204" pitchFamily="49" charset="0"/>
+              </a:rPr>
+              <a:t> </a:t>
+            </a:r>
+            <a:r>
+              <a:rPr lang="en-US" altLang="ja-JP" sz="1600" smtClean="0">
+                <a:solidFill>
+                  <a:srgbClr val="0000FF"/>
+                </a:solidFill>
+                <a:highlight>
+                  <a:srgbClr val="FFFFFF"/>
+                </a:highlight>
+                <a:latin typeface="Consolas" panose="020B0609020204030204" pitchFamily="49" charset="0"/>
+              </a:rPr>
+              <a:t>sealed</a:t>
             </a:r>
             <a:endParaRPr lang="en-US" sz="1600" dirty="0">
               <a:solidFill>
@@ -25067,7 +25151,7 @@
           <a:graphicData uri="http://schemas.openxmlformats.org/presentationml/2006/ole">
             <mc:AlternateContent xmlns:mc="http://schemas.openxmlformats.org/markup-compatibility/2006">
               <mc:Choice xmlns:v="urn:schemas-microsoft-com:vml" Requires="v">
-                <p:oleObj spid="_x0000_s1057" name="Equation" r:id="rId3" imgW="1257300" imgH="457200" progId="Equation.3">
+                <p:oleObj spid="_x0000_s1059" name="Equation" r:id="rId3" imgW="1257300" imgH="457200" progId="Equation.3">
                   <p:embed/>
                 </p:oleObj>
               </mc:Choice>
@@ -25273,7 +25357,7 @@
           <a:graphicData uri="http://schemas.openxmlformats.org/presentationml/2006/ole">
             <mc:AlternateContent xmlns:mc="http://schemas.openxmlformats.org/markup-compatibility/2006">
               <mc:Choice xmlns:v="urn:schemas-microsoft-com:vml" Requires="v">
-                <p:oleObj spid="_x0000_s2081" name="Equation" r:id="rId3" imgW="1117600" imgH="190500" progId="Equation.3">
+                <p:oleObj spid="_x0000_s2083" name="Equation" r:id="rId3" imgW="1117600" imgH="190500" progId="Equation.3">
                   <p:embed/>
                 </p:oleObj>
               </mc:Choice>
@@ -25473,7 +25557,7 @@
           <a:graphicData uri="http://schemas.openxmlformats.org/presentationml/2006/ole">
             <mc:AlternateContent xmlns:mc="http://schemas.openxmlformats.org/markup-compatibility/2006">
               <mc:Choice xmlns:v="urn:schemas-microsoft-com:vml" Requires="v">
-                <p:oleObj spid="_x0000_s3105" name="Equation" r:id="rId3" imgW="1257300" imgH="457200" progId="Equation.3">
+                <p:oleObj spid="_x0000_s3107" name="Equation" r:id="rId3" imgW="1257300" imgH="457200" progId="Equation.3">
                   <p:embed/>
                 </p:oleObj>
               </mc:Choice>
@@ -25765,7 +25849,7 @@
               <a:lstStyle/>
               <a:p>
                 <a14:m>
-                  <m:oMathPara xmlns="" xmlns:m="http://schemas.openxmlformats.org/officeDocument/2006/math">
+                  <m:oMathPara xmlns:m="http://schemas.openxmlformats.org/officeDocument/2006/math" xmlns="">
                     <m:oMathParaPr>
                       <m:jc m:val="centerGroup"/>
                     </m:oMathParaPr>
@@ -25867,7 +25951,7 @@
               <a:lstStyle/>
               <a:p>
                 <a14:m>
-                  <m:oMathPara xmlns="" xmlns:m="http://schemas.openxmlformats.org/officeDocument/2006/math">
+                  <m:oMathPara xmlns:m="http://schemas.openxmlformats.org/officeDocument/2006/math" xmlns="">
                     <m:oMathParaPr>
                       <m:jc m:val="centerGroup"/>
                     </m:oMathParaPr>
@@ -26097,7 +26181,7 @@
               <a:lstStyle/>
               <a:p>
                 <a14:m>
-                  <m:oMathPara xmlns="" xmlns:m="http://schemas.openxmlformats.org/officeDocument/2006/math">
+                  <m:oMathPara xmlns:m="http://schemas.openxmlformats.org/officeDocument/2006/math" xmlns="">
                     <m:oMathParaPr>
                       <m:jc m:val="centerGroup"/>
                     </m:oMathParaPr>
@@ -26199,7 +26283,7 @@
               <a:lstStyle/>
               <a:p>
                 <a14:m>
-                  <m:oMathPara xmlns="" xmlns:m="http://schemas.openxmlformats.org/officeDocument/2006/math">
+                  <m:oMathPara xmlns:m="http://schemas.openxmlformats.org/officeDocument/2006/math" xmlns="">
                     <m:oMathParaPr>
                       <m:jc m:val="centerGroup"/>
                     </m:oMathParaPr>
@@ -26469,7 +26553,7 @@
               <a:lstStyle/>
               <a:p>
                 <a14:m>
-                  <m:oMathPara xmlns="" xmlns:m="http://schemas.openxmlformats.org/officeDocument/2006/math">
+                  <m:oMathPara xmlns:m="http://schemas.openxmlformats.org/officeDocument/2006/math" xmlns="">
                     <m:oMathParaPr>
                       <m:jc m:val="centerGroup"/>
                     </m:oMathParaPr>
@@ -26799,11 +26883,7 @@
           <a:p>
             <a:r>
               <a:rPr lang="en-US" dirty="0" smtClean="0"/>
-              <a:t>Two </a:t>
-            </a:r>
-            <a:r>
-              <a:rPr lang="en-US" dirty="0" smtClean="0"/>
-              <a:t>applications: Synthesis and Filtering</a:t>
+              <a:t>Two applications: Synthesis and Filtering</a:t>
             </a:r>
           </a:p>
           <a:p>
@@ -26829,11 +26909,7 @@
             <a:pPr lvl="1"/>
             <a:r>
               <a:rPr lang="en-US" dirty="0" smtClean="0"/>
-              <a:t>Output a sinusoid with frequency set by magnitude of </a:t>
-            </a:r>
-            <a:r>
-              <a:rPr lang="en-US" dirty="0" smtClean="0"/>
-              <a:t>gyroscope</a:t>
+              <a:t>Output a sinusoid with frequency set by magnitude of gyroscope</a:t>
             </a:r>
           </a:p>
           <a:p>
@@ -26850,11 +26926,7 @@
             <a:pPr lvl="1"/>
             <a:r>
               <a:rPr lang="en-US" dirty="0" smtClean="0"/>
-              <a:t>Take that synthesized output and a</a:t>
-            </a:r>
-            <a:r>
-              <a:rPr lang="en-US" dirty="0" smtClean="0"/>
-              <a:t>pply </a:t>
+              <a:t>Take that synthesized output and apply </a:t>
             </a:r>
             <a:r>
               <a:rPr lang="en-US" dirty="0"/>
@@ -27745,11 +27817,7 @@
             <a:pPr lvl="1"/>
             <a:r>
               <a:rPr lang="en-US" dirty="0" smtClean="0"/>
-              <a:t>If you fail to do this, initializing the audio subsystem will </a:t>
-            </a:r>
-            <a:r>
-              <a:rPr lang="en-US" dirty="0" smtClean="0"/>
-              <a:t>fail</a:t>
+              <a:t>If you fail to do this, initializing the audio subsystem will fail</a:t>
             </a:r>
           </a:p>
           <a:p>
@@ -29610,11 +29678,7 @@
             <a:pPr lvl="1"/>
             <a:r>
               <a:rPr lang="en-US" dirty="0" smtClean="0"/>
-              <a:t>Remember, </a:t>
-            </a:r>
-            <a:r>
-              <a:rPr lang="en-US" dirty="0" smtClean="0"/>
-              <a:t>because you are using </a:t>
+              <a:t>Remember, because you are using </a:t>
             </a:r>
             <a:r>
               <a:rPr lang="en-US" dirty="0">
@@ -30223,19 +30287,7 @@
                 </a:highlight>
                 <a:latin typeface="Consolas" panose="020B0609020204030204" pitchFamily="49" charset="0"/>
               </a:rPr>
-              <a:t> phase)</a:t>
-            </a:r>
-            <a:r>
-              <a:rPr lang="en-US" sz="1600" dirty="0" smtClean="0">
-                <a:solidFill>
-                  <a:srgbClr val="000000"/>
-                </a:solidFill>
-                <a:highlight>
-                  <a:srgbClr val="FFFFFF"/>
-                </a:highlight>
-                <a:latin typeface="Consolas" panose="020B0609020204030204" pitchFamily="49" charset="0"/>
-              </a:rPr>
-              <a:t>;</a:t>
+              <a:t> phase);</a:t>
             </a:r>
             <a:endParaRPr lang="en-US" sz="1600" dirty="0">
               <a:solidFill>

</xml_diff>